<commit_message>
finished report except Appendix
and modified directory structures
</commit_message>
<xml_diff>
--- a/poster/yuda-poster.pptx
+++ b/poster/yuda-poster.pptx
@@ -238,7 +238,7 @@
           <a:p>
             <a:fld id="{71F2050C-D2F6-486D-B341-51335F772643}" type="datetimeFigureOut">
               <a:rPr kumimoji="1" lang="ja-JP" altLang="en-US" smtClean="0"/>
-              <a:t>2019/2/6</a:t>
+              <a:t>2019/2/8</a:t>
             </a:fld>
             <a:endParaRPr kumimoji="1" lang="ja-JP" altLang="en-US"/>
           </a:p>
@@ -4460,12 +4460,12 @@
           <a:p>
             <a:pPr eaLnBrk="1" hangingPunct="1"/>
             <a:r>
-              <a:rPr lang="ja-JP" altLang="en-US" sz="4800" b="1" dirty="0"/>
-              <a:t>出村　</a:t>
+              <a:rPr lang="ja-JP" altLang="en-US" sz="4800" b="1" smtClean="0"/>
+              <a:t>出村研究室</a:t>
             </a:r>
             <a:r>
               <a:rPr lang="ja-JP" altLang="en-US" sz="4800" b="1" dirty="0" smtClean="0"/>
-              <a:t>研究室　湯田　晴也</a:t>
+              <a:t>　湯田　晴也</a:t>
             </a:r>
             <a:endParaRPr lang="en-US" altLang="ja-JP" sz="4800" b="1" dirty="0" smtClean="0"/>
           </a:p>

</xml_diff>